<commit_message>
Cezmi added Hashtable to the App
</commit_message>
<xml_diff>
--- a/ProjectDataStrc.pptx
+++ b/ProjectDataStrc.pptx
@@ -6690,10 +6690,10 @@
       </p:sp>
       <p:pic>
         <p:nvPicPr>
-          <p:cNvPr id="6" name="Picture 5">
+          <p:cNvPr id="3" name="Picture 2">
             <a:extLst>
               <a:ext uri="{FF2B5EF4-FFF2-40B4-BE49-F238E27FC236}">
-                <a16:creationId xmlns:a16="http://schemas.microsoft.com/office/drawing/2014/main" id="{D2D992A8-9FF4-4998-8E82-6EC15CCC7C8E}"/>
+                <a16:creationId xmlns:a16="http://schemas.microsoft.com/office/drawing/2014/main" id="{B9C51559-6FEF-41D1-8E08-9EAC36E77614}"/>
               </a:ext>
             </a:extLst>
           </p:cNvPr>
@@ -6710,64 +6710,14 @@
         </p:blipFill>
         <p:spPr>
           <a:xfrm>
-            <a:off x="169605" y="275962"/>
-            <a:ext cx="8841658" cy="2830051"/>
+            <a:off x="2414412" y="0"/>
+            <a:ext cx="4315175" cy="5143500"/>
           </a:xfrm>
           <a:prstGeom prst="rect">
             <a:avLst/>
           </a:prstGeom>
         </p:spPr>
       </p:pic>
-      <p:sp>
-        <p:nvSpPr>
-          <p:cNvPr id="7" name="TextBox 6">
-            <a:extLst>
-              <a:ext uri="{FF2B5EF4-FFF2-40B4-BE49-F238E27FC236}">
-                <a16:creationId xmlns:a16="http://schemas.microsoft.com/office/drawing/2014/main" id="{F98C4DC1-3F34-460E-A09F-5FF3C80A081D}"/>
-              </a:ext>
-            </a:extLst>
-          </p:cNvPr>
-          <p:cNvSpPr txBox="1"/>
-          <p:nvPr/>
-        </p:nvSpPr>
-        <p:spPr>
-          <a:xfrm>
-            <a:off x="1406932" y="3287143"/>
-            <a:ext cx="5362578" cy="276999"/>
-          </a:xfrm>
-          <a:prstGeom prst="rect">
-            <a:avLst/>
-          </a:prstGeom>
-          <a:noFill/>
-        </p:spPr>
-        <p:txBody>
-          <a:bodyPr wrap="square">
-            <a:spAutoFit/>
-          </a:bodyPr>
-          <a:lstStyle/>
-          <a:p>
-            <a:pPr marL="0" lvl="0" indent="0" algn="l" rtl="0">
-              <a:spcBef>
-                <a:spcPts val="600"/>
-              </a:spcBef>
-              <a:spcAft>
-                <a:spcPts val="0"/>
-              </a:spcAft>
-              <a:buNone/>
-            </a:pPr>
-            <a:r>
-              <a:rPr lang="en-US" sz="1200" i="1" dirty="0">
-                <a:solidFill>
-                  <a:schemeClr val="bg1"/>
-                </a:solidFill>
-                <a:latin typeface="Calibri" panose="020F0502020204030204" pitchFamily="34" charset="0"/>
-                <a:cs typeface="Calibri" panose="020F0502020204030204" pitchFamily="34" charset="0"/>
-              </a:rPr>
-              <a:t>The app asks user to select one of the options</a:t>
-            </a:r>
-          </a:p>
-        </p:txBody>
-      </p:sp>
     </p:spTree>
     <p:extLst>
       <p:ext uri="{BB962C8B-B14F-4D97-AF65-F5344CB8AC3E}">
@@ -6838,10 +6788,10 @@
       </p:sp>
       <p:pic>
         <p:nvPicPr>
-          <p:cNvPr id="7" name="Picture 6">
+          <p:cNvPr id="3" name="Picture 2">
             <a:extLst>
               <a:ext uri="{FF2B5EF4-FFF2-40B4-BE49-F238E27FC236}">
-                <a16:creationId xmlns:a16="http://schemas.microsoft.com/office/drawing/2014/main" id="{CEF2022A-0F86-4841-B7CD-0233D5D7F218}"/>
+                <a16:creationId xmlns:a16="http://schemas.microsoft.com/office/drawing/2014/main" id="{ADEF7ABD-5C29-4260-8127-737ABA6D66A2}"/>
               </a:ext>
             </a:extLst>
           </p:cNvPr>
@@ -6858,103 +6808,14 @@
         </p:blipFill>
         <p:spPr>
           <a:xfrm>
-            <a:off x="64769" y="357251"/>
-            <a:ext cx="6402399" cy="4461246"/>
+            <a:off x="2750344" y="0"/>
+            <a:ext cx="3643312" cy="5143500"/>
           </a:xfrm>
           <a:prstGeom prst="rect">
             <a:avLst/>
           </a:prstGeom>
         </p:spPr>
       </p:pic>
-      <p:sp>
-        <p:nvSpPr>
-          <p:cNvPr id="8" name="TextBox 7">
-            <a:extLst>
-              <a:ext uri="{FF2B5EF4-FFF2-40B4-BE49-F238E27FC236}">
-                <a16:creationId xmlns:a16="http://schemas.microsoft.com/office/drawing/2014/main" id="{629197F4-638F-4234-8FCB-3DF400576B5B}"/>
-              </a:ext>
-            </a:extLst>
-          </p:cNvPr>
-          <p:cNvSpPr txBox="1"/>
-          <p:nvPr/>
-        </p:nvSpPr>
-        <p:spPr>
-          <a:xfrm>
-            <a:off x="6650112" y="440704"/>
-            <a:ext cx="2421745" cy="1169551"/>
-          </a:xfrm>
-          <a:prstGeom prst="rect">
-            <a:avLst/>
-          </a:prstGeom>
-          <a:noFill/>
-        </p:spPr>
-        <p:txBody>
-          <a:bodyPr wrap="square">
-            <a:spAutoFit/>
-          </a:bodyPr>
-          <a:lstStyle/>
-          <a:p>
-            <a:pPr marL="0" lvl="0" indent="0" algn="l" rtl="0">
-              <a:spcBef>
-                <a:spcPts val="600"/>
-              </a:spcBef>
-              <a:spcAft>
-                <a:spcPts val="0"/>
-              </a:spcAft>
-              <a:buNone/>
-            </a:pPr>
-            <a:r>
-              <a:rPr lang="en-US" sz="1200" i="1" dirty="0">
-                <a:solidFill>
-                  <a:schemeClr val="bg1"/>
-                </a:solidFill>
-                <a:latin typeface="Calibri" panose="020F0502020204030204" pitchFamily="34" charset="0"/>
-                <a:cs typeface="Calibri" panose="020F0502020204030204" pitchFamily="34" charset="0"/>
-              </a:rPr>
-              <a:t>If user selects 4 , the Average Calculation System will be executed.</a:t>
-            </a:r>
-          </a:p>
-          <a:p>
-            <a:pPr marL="0" lvl="0" indent="0" algn="l" rtl="0">
-              <a:spcBef>
-                <a:spcPts val="600"/>
-              </a:spcBef>
-              <a:spcAft>
-                <a:spcPts val="0"/>
-              </a:spcAft>
-              <a:buNone/>
-            </a:pPr>
-            <a:endParaRPr lang="en-US" sz="1200" i="1" dirty="0">
-              <a:solidFill>
-                <a:schemeClr val="bg1"/>
-              </a:solidFill>
-              <a:latin typeface="Calibri" panose="020F0502020204030204" pitchFamily="34" charset="0"/>
-              <a:cs typeface="Calibri" panose="020F0502020204030204" pitchFamily="34" charset="0"/>
-            </a:endParaRPr>
-          </a:p>
-          <a:p>
-            <a:pPr marL="0" lvl="0" indent="0" algn="l" rtl="0">
-              <a:spcBef>
-                <a:spcPts val="600"/>
-              </a:spcBef>
-              <a:spcAft>
-                <a:spcPts val="0"/>
-              </a:spcAft>
-              <a:buNone/>
-            </a:pPr>
-            <a:r>
-              <a:rPr lang="en-US" sz="1200" i="1" dirty="0">
-                <a:solidFill>
-                  <a:schemeClr val="bg1"/>
-                </a:solidFill>
-                <a:latin typeface="Calibri" panose="020F0502020204030204" pitchFamily="34" charset="0"/>
-                <a:cs typeface="Calibri" panose="020F0502020204030204" pitchFamily="34" charset="0"/>
-              </a:rPr>
-              <a:t>This system will ask some data input from user.</a:t>
-            </a:r>
-          </a:p>
-        </p:txBody>
-      </p:sp>
     </p:spTree>
     <p:extLst>
       <p:ext uri="{BB962C8B-B14F-4D97-AF65-F5344CB8AC3E}">
@@ -7025,10 +6886,10 @@
       </p:sp>
       <p:pic>
         <p:nvPicPr>
-          <p:cNvPr id="3" name="Picture 2">
+          <p:cNvPr id="6" name="Picture 5">
             <a:extLst>
               <a:ext uri="{FF2B5EF4-FFF2-40B4-BE49-F238E27FC236}">
-                <a16:creationId xmlns:a16="http://schemas.microsoft.com/office/drawing/2014/main" id="{A3003F46-1F0D-414E-8441-50A154B892B6}"/>
+                <a16:creationId xmlns:a16="http://schemas.microsoft.com/office/drawing/2014/main" id="{5D7232C3-F74E-4F8D-95B0-2A57F6905277}"/>
               </a:ext>
             </a:extLst>
           </p:cNvPr>
@@ -7037,71 +6898,22 @@
           </p:cNvPicPr>
           <p:nvPr/>
         </p:nvPicPr>
-        <p:blipFill rotWithShape="1">
+        <p:blipFill>
           <a:blip r:embed="rId2"/>
-          <a:srcRect t="4251" r="21274"/>
-          <a:stretch/>
+          <a:stretch>
+            <a:fillRect/>
+          </a:stretch>
         </p:blipFill>
         <p:spPr>
           <a:xfrm>
-            <a:off x="0" y="28486"/>
-            <a:ext cx="5797826" cy="5115013"/>
+            <a:off x="2190417" y="737931"/>
+            <a:ext cx="4763165" cy="3667637"/>
           </a:xfrm>
           <a:prstGeom prst="rect">
             <a:avLst/>
           </a:prstGeom>
         </p:spPr>
       </p:pic>
-      <p:sp>
-        <p:nvSpPr>
-          <p:cNvPr id="5" name="TextBox 4">
-            <a:extLst>
-              <a:ext uri="{FF2B5EF4-FFF2-40B4-BE49-F238E27FC236}">
-                <a16:creationId xmlns:a16="http://schemas.microsoft.com/office/drawing/2014/main" id="{07CD07AC-2360-4636-A1D9-FBA634EC5820}"/>
-              </a:ext>
-            </a:extLst>
-          </p:cNvPr>
-          <p:cNvSpPr txBox="1"/>
-          <p:nvPr/>
-        </p:nvSpPr>
-        <p:spPr>
-          <a:xfrm>
-            <a:off x="5943600" y="440704"/>
-            <a:ext cx="3128257" cy="646331"/>
-          </a:xfrm>
-          <a:prstGeom prst="rect">
-            <a:avLst/>
-          </a:prstGeom>
-          <a:noFill/>
-        </p:spPr>
-        <p:txBody>
-          <a:bodyPr wrap="square">
-            <a:spAutoFit/>
-          </a:bodyPr>
-          <a:lstStyle/>
-          <a:p>
-            <a:pPr marL="0" lvl="0" indent="0" algn="l" rtl="0">
-              <a:spcBef>
-                <a:spcPts val="600"/>
-              </a:spcBef>
-              <a:spcAft>
-                <a:spcPts val="0"/>
-              </a:spcAft>
-              <a:buNone/>
-            </a:pPr>
-            <a:r>
-              <a:rPr lang="en-US" sz="1200" i="1" dirty="0">
-                <a:solidFill>
-                  <a:schemeClr val="bg1"/>
-                </a:solidFill>
-                <a:latin typeface="Calibri" panose="020F0502020204030204" pitchFamily="34" charset="0"/>
-                <a:cs typeface="Calibri" panose="020F0502020204030204" pitchFamily="34" charset="0"/>
-              </a:rPr>
-              <a:t>After collecting all data, The app will calculate the average and display a proper message to the users.</a:t>
-            </a:r>
-          </a:p>
-        </p:txBody>
-      </p:sp>
     </p:spTree>
     <p:extLst>
       <p:ext uri="{BB962C8B-B14F-4D97-AF65-F5344CB8AC3E}">
@@ -7373,7 +7185,7 @@
         </p:nvSpPr>
         <p:spPr>
           <a:xfrm>
-            <a:off x="6219025" y="1179281"/>
+            <a:off x="3692250" y="2756452"/>
             <a:ext cx="2403600" cy="1206000"/>
           </a:xfrm>
           <a:prstGeom prst="rect">
@@ -7539,7 +7351,7 @@
         </p:nvSpPr>
         <p:spPr>
           <a:xfrm>
-            <a:off x="3592024" y="2669913"/>
+            <a:off x="6280360" y="1179146"/>
             <a:ext cx="2403600" cy="1206000"/>
           </a:xfrm>
           <a:prstGeom prst="rect">
@@ -7821,6 +7633,312 @@
               <a:t>Used to calculate average mark of a student.</a:t>
             </a:r>
             <a:endParaRPr lang="en-US" sz="1200" dirty="0"/>
+          </a:p>
+        </p:txBody>
+      </p:sp>
+      <p:sp>
+        <p:nvSpPr>
+          <p:cNvPr id="10" name="Google Shape;236;p29">
+            <a:extLst>
+              <a:ext uri="{FF2B5EF4-FFF2-40B4-BE49-F238E27FC236}">
+                <a16:creationId xmlns:a16="http://schemas.microsoft.com/office/drawing/2014/main" id="{8291A95E-99D2-4C87-9262-556A9F86F399}"/>
+              </a:ext>
+            </a:extLst>
+          </p:cNvPr>
+          <p:cNvSpPr txBox="1">
+            <a:spLocks/>
+          </p:cNvSpPr>
+          <p:nvPr/>
+        </p:nvSpPr>
+        <p:spPr>
+          <a:xfrm>
+            <a:off x="6393907" y="2756452"/>
+            <a:ext cx="2403600" cy="1206000"/>
+          </a:xfrm>
+          <a:prstGeom prst="rect">
+            <a:avLst/>
+          </a:prstGeom>
+          <a:noFill/>
+          <a:ln>
+            <a:noFill/>
+          </a:ln>
+        </p:spPr>
+        <p:txBody>
+          <a:bodyPr spcFirstLastPara="1" wrap="square" lIns="91425" tIns="91425" rIns="91425" bIns="91425" anchor="t" anchorCtr="0">
+            <a:noAutofit/>
+          </a:bodyPr>
+          <a:lstStyle>
+            <a:defPPr marR="0" lvl="0" algn="l" rtl="0">
+              <a:lnSpc>
+                <a:spcPct val="100000"/>
+              </a:lnSpc>
+              <a:spcBef>
+                <a:spcPts val="0"/>
+              </a:spcBef>
+              <a:spcAft>
+                <a:spcPts val="0"/>
+              </a:spcAft>
+            </a:defPPr>
+            <a:lvl1pPr marL="457200" marR="0" lvl="0" indent="-342900" algn="l" rtl="0">
+              <a:lnSpc>
+                <a:spcPct val="100000"/>
+              </a:lnSpc>
+              <a:spcBef>
+                <a:spcPts val="600"/>
+              </a:spcBef>
+              <a:spcAft>
+                <a:spcPts val="0"/>
+              </a:spcAft>
+              <a:buClr>
+                <a:schemeClr val="accent1"/>
+              </a:buClr>
+              <a:buSzPts val="1800"/>
+              <a:buFont typeface="Quicksand"/>
+              <a:buChar char="◦"/>
+              <a:defRPr sz="1800" b="0" i="0" u="none" strike="noStrike" cap="none">
+                <a:solidFill>
+                  <a:schemeClr val="lt1"/>
+                </a:solidFill>
+                <a:latin typeface="Quicksand"/>
+                <a:ea typeface="Quicksand"/>
+                <a:cs typeface="Quicksand"/>
+                <a:sym typeface="Quicksand"/>
+              </a:defRPr>
+            </a:lvl1pPr>
+            <a:lvl2pPr marL="914400" marR="0" lvl="1" indent="-342900" algn="l" rtl="0">
+              <a:lnSpc>
+                <a:spcPct val="100000"/>
+              </a:lnSpc>
+              <a:spcBef>
+                <a:spcPts val="0"/>
+              </a:spcBef>
+              <a:spcAft>
+                <a:spcPts val="0"/>
+              </a:spcAft>
+              <a:buClr>
+                <a:schemeClr val="accent1"/>
+              </a:buClr>
+              <a:buSzPts val="1800"/>
+              <a:buFont typeface="Quicksand"/>
+              <a:buChar char="▫"/>
+              <a:defRPr sz="1800" b="0" i="0" u="none" strike="noStrike" cap="none">
+                <a:solidFill>
+                  <a:schemeClr val="lt1"/>
+                </a:solidFill>
+                <a:latin typeface="Quicksand"/>
+                <a:ea typeface="Quicksand"/>
+                <a:cs typeface="Quicksand"/>
+                <a:sym typeface="Quicksand"/>
+              </a:defRPr>
+            </a:lvl2pPr>
+            <a:lvl3pPr marL="1371600" marR="0" lvl="2" indent="-342900" algn="l" rtl="0">
+              <a:lnSpc>
+                <a:spcPct val="100000"/>
+              </a:lnSpc>
+              <a:spcBef>
+                <a:spcPts val="0"/>
+              </a:spcBef>
+              <a:spcAft>
+                <a:spcPts val="0"/>
+              </a:spcAft>
+              <a:buClr>
+                <a:schemeClr val="accent1"/>
+              </a:buClr>
+              <a:buSzPts val="1800"/>
+              <a:buFont typeface="Quicksand"/>
+              <a:buChar char="■"/>
+              <a:defRPr sz="1800" b="0" i="0" u="none" strike="noStrike" cap="none">
+                <a:solidFill>
+                  <a:schemeClr val="lt1"/>
+                </a:solidFill>
+                <a:latin typeface="Quicksand"/>
+                <a:ea typeface="Quicksand"/>
+                <a:cs typeface="Quicksand"/>
+                <a:sym typeface="Quicksand"/>
+              </a:defRPr>
+            </a:lvl3pPr>
+            <a:lvl4pPr marL="1828800" marR="0" lvl="3" indent="-342900" algn="l" rtl="0">
+              <a:lnSpc>
+                <a:spcPct val="100000"/>
+              </a:lnSpc>
+              <a:spcBef>
+                <a:spcPts val="0"/>
+              </a:spcBef>
+              <a:spcAft>
+                <a:spcPts val="0"/>
+              </a:spcAft>
+              <a:buClr>
+                <a:schemeClr val="lt1"/>
+              </a:buClr>
+              <a:buSzPts val="1800"/>
+              <a:buFont typeface="Quicksand"/>
+              <a:buChar char="●"/>
+              <a:defRPr sz="1800" b="0" i="0" u="none" strike="noStrike" cap="none">
+                <a:solidFill>
+                  <a:schemeClr val="lt1"/>
+                </a:solidFill>
+                <a:latin typeface="Quicksand"/>
+                <a:ea typeface="Quicksand"/>
+                <a:cs typeface="Quicksand"/>
+                <a:sym typeface="Quicksand"/>
+              </a:defRPr>
+            </a:lvl4pPr>
+            <a:lvl5pPr marL="2286000" marR="0" lvl="4" indent="-342900" algn="l" rtl="0">
+              <a:lnSpc>
+                <a:spcPct val="100000"/>
+              </a:lnSpc>
+              <a:spcBef>
+                <a:spcPts val="0"/>
+              </a:spcBef>
+              <a:spcAft>
+                <a:spcPts val="0"/>
+              </a:spcAft>
+              <a:buClr>
+                <a:schemeClr val="lt1"/>
+              </a:buClr>
+              <a:buSzPts val="1800"/>
+              <a:buFont typeface="Quicksand"/>
+              <a:buChar char="○"/>
+              <a:defRPr sz="1800" b="0" i="0" u="none" strike="noStrike" cap="none">
+                <a:solidFill>
+                  <a:schemeClr val="lt1"/>
+                </a:solidFill>
+                <a:latin typeface="Quicksand"/>
+                <a:ea typeface="Quicksand"/>
+                <a:cs typeface="Quicksand"/>
+                <a:sym typeface="Quicksand"/>
+              </a:defRPr>
+            </a:lvl5pPr>
+            <a:lvl6pPr marL="2743200" marR="0" lvl="5" indent="-342900" algn="l" rtl="0">
+              <a:lnSpc>
+                <a:spcPct val="100000"/>
+              </a:lnSpc>
+              <a:spcBef>
+                <a:spcPts val="0"/>
+              </a:spcBef>
+              <a:spcAft>
+                <a:spcPts val="0"/>
+              </a:spcAft>
+              <a:buClr>
+                <a:schemeClr val="lt1"/>
+              </a:buClr>
+              <a:buSzPts val="1800"/>
+              <a:buFont typeface="Quicksand"/>
+              <a:buChar char="■"/>
+              <a:defRPr sz="1800" b="0" i="0" u="none" strike="noStrike" cap="none">
+                <a:solidFill>
+                  <a:schemeClr val="lt1"/>
+                </a:solidFill>
+                <a:latin typeface="Quicksand"/>
+                <a:ea typeface="Quicksand"/>
+                <a:cs typeface="Quicksand"/>
+                <a:sym typeface="Quicksand"/>
+              </a:defRPr>
+            </a:lvl6pPr>
+            <a:lvl7pPr marL="3200400" marR="0" lvl="6" indent="-342900" algn="l" rtl="0">
+              <a:lnSpc>
+                <a:spcPct val="100000"/>
+              </a:lnSpc>
+              <a:spcBef>
+                <a:spcPts val="0"/>
+              </a:spcBef>
+              <a:spcAft>
+                <a:spcPts val="0"/>
+              </a:spcAft>
+              <a:buClr>
+                <a:schemeClr val="lt1"/>
+              </a:buClr>
+              <a:buSzPts val="1800"/>
+              <a:buFont typeface="Quicksand"/>
+              <a:buChar char="●"/>
+              <a:defRPr sz="1800" b="0" i="0" u="none" strike="noStrike" cap="none">
+                <a:solidFill>
+                  <a:schemeClr val="lt1"/>
+                </a:solidFill>
+                <a:latin typeface="Quicksand"/>
+                <a:ea typeface="Quicksand"/>
+                <a:cs typeface="Quicksand"/>
+                <a:sym typeface="Quicksand"/>
+              </a:defRPr>
+            </a:lvl7pPr>
+            <a:lvl8pPr marL="3657600" marR="0" lvl="7" indent="-342900" algn="l" rtl="0">
+              <a:lnSpc>
+                <a:spcPct val="100000"/>
+              </a:lnSpc>
+              <a:spcBef>
+                <a:spcPts val="0"/>
+              </a:spcBef>
+              <a:spcAft>
+                <a:spcPts val="0"/>
+              </a:spcAft>
+              <a:buClr>
+                <a:schemeClr val="lt1"/>
+              </a:buClr>
+              <a:buSzPts val="1800"/>
+              <a:buFont typeface="Quicksand"/>
+              <a:buChar char="○"/>
+              <a:defRPr sz="1800" b="0" i="0" u="none" strike="noStrike" cap="none">
+                <a:solidFill>
+                  <a:schemeClr val="lt1"/>
+                </a:solidFill>
+                <a:latin typeface="Quicksand"/>
+                <a:ea typeface="Quicksand"/>
+                <a:cs typeface="Quicksand"/>
+                <a:sym typeface="Quicksand"/>
+              </a:defRPr>
+            </a:lvl8pPr>
+            <a:lvl9pPr marL="4114800" marR="0" lvl="8" indent="-342900" algn="l" rtl="0">
+              <a:lnSpc>
+                <a:spcPct val="100000"/>
+              </a:lnSpc>
+              <a:spcBef>
+                <a:spcPts val="0"/>
+              </a:spcBef>
+              <a:spcAft>
+                <a:spcPts val="0"/>
+              </a:spcAft>
+              <a:buClr>
+                <a:schemeClr val="lt1"/>
+              </a:buClr>
+              <a:buSzPts val="1800"/>
+              <a:buFont typeface="Quicksand"/>
+              <a:buChar char="■"/>
+              <a:defRPr sz="1800" b="0" i="0" u="none" strike="noStrike" cap="none">
+                <a:solidFill>
+                  <a:schemeClr val="lt1"/>
+                </a:solidFill>
+                <a:latin typeface="Quicksand"/>
+                <a:ea typeface="Quicksand"/>
+                <a:cs typeface="Quicksand"/>
+                <a:sym typeface="Quicksand"/>
+              </a:defRPr>
+            </a:lvl9pPr>
+          </a:lstStyle>
+          <a:p>
+            <a:pPr marL="0" indent="0">
+              <a:buFont typeface="Quicksand"/>
+              <a:buNone/>
+            </a:pPr>
+            <a:r>
+              <a:rPr lang="en-CA" b="1" dirty="0" err="1"/>
+              <a:t>Hashtable</a:t>
+            </a:r>
+            <a:endParaRPr lang="en-CA" b="1" dirty="0"/>
+          </a:p>
+          <a:p>
+            <a:pPr marL="0" indent="0">
+              <a:buFont typeface="Quicksand"/>
+              <a:buNone/>
+            </a:pPr>
+            <a:r>
+              <a:rPr lang="en-CA" sz="1200" dirty="0"/>
+              <a:t>Used to store roll number and average </a:t>
+            </a:r>
+            <a:r>
+              <a:rPr lang="en-CA" sz="1200"/>
+              <a:t>of students.</a:t>
+            </a:r>
+            <a:endParaRPr lang="en-CA" sz="1200" dirty="0"/>
           </a:p>
         </p:txBody>
       </p:sp>

</xml_diff>